<commit_message>
Add updated e2e examples
</commit_message>
<xml_diff>
--- a/fsh-tank/input/images-source/ToCMessageStructure.pptx
+++ b/fsh-tank/input/images-source/ToCMessageStructure.pptx
@@ -5,7 +5,8 @@
     <p:sldMasterId id="2147483648" r:id="rId1"/>
   </p:sldMasterIdLst>
   <p:sldIdLst>
-    <p:sldId id="259" r:id="rId2"/>
+    <p:sldId id="260" r:id="rId2"/>
+    <p:sldId id="259" r:id="rId3"/>
   </p:sldIdLst>
   <p:sldSz cx="12192000" cy="6858000"/>
   <p:notesSz cx="6858000" cy="9144000"/>
@@ -261,7 +262,7 @@
           <a:p>
             <a:fld id="{841460FE-8B04-4DFA-A195-FC6E427B59C1}" type="datetimeFigureOut">
               <a:rPr lang="en-GB" smtClean="0"/>
-              <a:t>17/05/2022</a:t>
+              <a:t>23/06/2022</a:t>
             </a:fld>
             <a:endParaRPr lang="en-GB"/>
           </a:p>
@@ -461,7 +462,7 @@
           <a:p>
             <a:fld id="{841460FE-8B04-4DFA-A195-FC6E427B59C1}" type="datetimeFigureOut">
               <a:rPr lang="en-GB" smtClean="0"/>
-              <a:t>17/05/2022</a:t>
+              <a:t>23/06/2022</a:t>
             </a:fld>
             <a:endParaRPr lang="en-GB"/>
           </a:p>
@@ -671,7 +672,7 @@
           <a:p>
             <a:fld id="{841460FE-8B04-4DFA-A195-FC6E427B59C1}" type="datetimeFigureOut">
               <a:rPr lang="en-GB" smtClean="0"/>
-              <a:t>17/05/2022</a:t>
+              <a:t>23/06/2022</a:t>
             </a:fld>
             <a:endParaRPr lang="en-GB"/>
           </a:p>
@@ -871,7 +872,7 @@
           <a:p>
             <a:fld id="{841460FE-8B04-4DFA-A195-FC6E427B59C1}" type="datetimeFigureOut">
               <a:rPr lang="en-GB" smtClean="0"/>
-              <a:t>17/05/2022</a:t>
+              <a:t>23/06/2022</a:t>
             </a:fld>
             <a:endParaRPr lang="en-GB"/>
           </a:p>
@@ -1147,7 +1148,7 @@
           <a:p>
             <a:fld id="{841460FE-8B04-4DFA-A195-FC6E427B59C1}" type="datetimeFigureOut">
               <a:rPr lang="en-GB" smtClean="0"/>
-              <a:t>17/05/2022</a:t>
+              <a:t>23/06/2022</a:t>
             </a:fld>
             <a:endParaRPr lang="en-GB"/>
           </a:p>
@@ -1415,7 +1416,7 @@
           <a:p>
             <a:fld id="{841460FE-8B04-4DFA-A195-FC6E427B59C1}" type="datetimeFigureOut">
               <a:rPr lang="en-GB" smtClean="0"/>
-              <a:t>17/05/2022</a:t>
+              <a:t>23/06/2022</a:t>
             </a:fld>
             <a:endParaRPr lang="en-GB"/>
           </a:p>
@@ -1830,7 +1831,7 @@
           <a:p>
             <a:fld id="{841460FE-8B04-4DFA-A195-FC6E427B59C1}" type="datetimeFigureOut">
               <a:rPr lang="en-GB" smtClean="0"/>
-              <a:t>17/05/2022</a:t>
+              <a:t>23/06/2022</a:t>
             </a:fld>
             <a:endParaRPr lang="en-GB"/>
           </a:p>
@@ -1972,7 +1973,7 @@
           <a:p>
             <a:fld id="{841460FE-8B04-4DFA-A195-FC6E427B59C1}" type="datetimeFigureOut">
               <a:rPr lang="en-GB" smtClean="0"/>
-              <a:t>17/05/2022</a:t>
+              <a:t>23/06/2022</a:t>
             </a:fld>
             <a:endParaRPr lang="en-GB"/>
           </a:p>
@@ -2085,7 +2086,7 @@
           <a:p>
             <a:fld id="{841460FE-8B04-4DFA-A195-FC6E427B59C1}" type="datetimeFigureOut">
               <a:rPr lang="en-GB" smtClean="0"/>
-              <a:t>17/05/2022</a:t>
+              <a:t>23/06/2022</a:t>
             </a:fld>
             <a:endParaRPr lang="en-GB"/>
           </a:p>
@@ -2398,7 +2399,7 @@
           <a:p>
             <a:fld id="{841460FE-8B04-4DFA-A195-FC6E427B59C1}" type="datetimeFigureOut">
               <a:rPr lang="en-GB" smtClean="0"/>
-              <a:t>17/05/2022</a:t>
+              <a:t>23/06/2022</a:t>
             </a:fld>
             <a:endParaRPr lang="en-GB"/>
           </a:p>
@@ -2687,7 +2688,7 @@
           <a:p>
             <a:fld id="{841460FE-8B04-4DFA-A195-FC6E427B59C1}" type="datetimeFigureOut">
               <a:rPr lang="en-GB" smtClean="0"/>
-              <a:t>17/05/2022</a:t>
+              <a:t>23/06/2022</a:t>
             </a:fld>
             <a:endParaRPr lang="en-GB"/>
           </a:p>
@@ -2930,7 +2931,7 @@
           <a:p>
             <a:fld id="{841460FE-8B04-4DFA-A195-FC6E427B59C1}" type="datetimeFigureOut">
               <a:rPr lang="en-GB" smtClean="0"/>
-              <a:t>17/05/2022</a:t>
+              <a:t>23/06/2022</a:t>
             </a:fld>
             <a:endParaRPr lang="en-GB"/>
           </a:p>
@@ -5211,6 +5212,2023 @@
           </a:fontRef>
         </p:style>
       </p:cxnSp>
+      <p:cxnSp>
+        <p:nvCxnSpPr>
+          <p:cNvPr id="5" name="Straight Connector 4">
+            <a:extLst>
+              <a:ext uri="{FF2B5EF4-FFF2-40B4-BE49-F238E27FC236}">
+                <a16:creationId xmlns:a16="http://schemas.microsoft.com/office/drawing/2014/main" id="{21405262-C3F8-12CA-4974-DF84AB127D72}"/>
+              </a:ext>
+            </a:extLst>
+          </p:cNvPr>
+          <p:cNvCxnSpPr/>
+          <p:nvPr/>
+        </p:nvCxnSpPr>
+        <p:spPr>
+          <a:xfrm>
+            <a:off x="1366463" y="513708"/>
+            <a:ext cx="8363164" cy="5296958"/>
+          </a:xfrm>
+          <a:prstGeom prst="line">
+            <a:avLst/>
+          </a:prstGeom>
+        </p:spPr>
+        <p:style>
+          <a:lnRef idx="1">
+            <a:schemeClr val="accent1"/>
+          </a:lnRef>
+          <a:fillRef idx="0">
+            <a:schemeClr val="accent1"/>
+          </a:fillRef>
+          <a:effectRef idx="0">
+            <a:schemeClr val="accent1"/>
+          </a:effectRef>
+          <a:fontRef idx="minor">
+            <a:schemeClr val="tx1"/>
+          </a:fontRef>
+        </p:style>
+      </p:cxnSp>
+      <p:cxnSp>
+        <p:nvCxnSpPr>
+          <p:cNvPr id="7" name="Straight Connector 6">
+            <a:extLst>
+              <a:ext uri="{FF2B5EF4-FFF2-40B4-BE49-F238E27FC236}">
+                <a16:creationId xmlns:a16="http://schemas.microsoft.com/office/drawing/2014/main" id="{A725453C-B745-9214-44E6-3007DED81B9F}"/>
+              </a:ext>
+            </a:extLst>
+          </p:cNvPr>
+          <p:cNvCxnSpPr/>
+          <p:nvPr/>
+        </p:nvCxnSpPr>
+        <p:spPr>
+          <a:xfrm flipV="1">
+            <a:off x="1325366" y="1783143"/>
+            <a:ext cx="9061807" cy="4027523"/>
+          </a:xfrm>
+          <a:prstGeom prst="line">
+            <a:avLst/>
+          </a:prstGeom>
+        </p:spPr>
+        <p:style>
+          <a:lnRef idx="1">
+            <a:schemeClr val="accent1"/>
+          </a:lnRef>
+          <a:fillRef idx="0">
+            <a:schemeClr val="accent1"/>
+          </a:fillRef>
+          <a:effectRef idx="0">
+            <a:schemeClr val="accent1"/>
+          </a:effectRef>
+          <a:fontRef idx="minor">
+            <a:schemeClr val="tx1"/>
+          </a:fontRef>
+        </p:style>
+      </p:cxnSp>
+    </p:spTree>
+    <p:extLst>
+      <p:ext uri="{BB962C8B-B14F-4D97-AF65-F5344CB8AC3E}">
+        <p14:creationId xmlns:p14="http://schemas.microsoft.com/office/powerpoint/2010/main" val="1278311922"/>
+      </p:ext>
+    </p:extLst>
+  </p:cSld>
+  <p:clrMapOvr>
+    <a:masterClrMapping/>
+  </p:clrMapOvr>
+</p:sld>
+</file>
+
+<file path=ppt/slides/slide2.xml><?xml version="1.0" encoding="utf-8"?>
+<p:sld xmlns:a="http://schemas.openxmlformats.org/drawingml/2006/main" xmlns:r="http://schemas.openxmlformats.org/officeDocument/2006/relationships" xmlns:p="http://schemas.openxmlformats.org/presentationml/2006/main">
+  <p:cSld>
+    <p:spTree>
+      <p:nvGrpSpPr>
+        <p:cNvPr id="1" name=""/>
+        <p:cNvGrpSpPr/>
+        <p:nvPr/>
+      </p:nvGrpSpPr>
+      <p:grpSpPr>
+        <a:xfrm>
+          <a:off x="0" y="0"/>
+          <a:ext cx="0" cy="0"/>
+          <a:chOff x="0" y="0"/>
+          <a:chExt cx="0" cy="0"/>
+        </a:xfrm>
+      </p:grpSpPr>
+      <p:sp>
+        <p:nvSpPr>
+          <p:cNvPr id="2" name="TextBox 1">
+            <a:extLst>
+              <a:ext uri="{FF2B5EF4-FFF2-40B4-BE49-F238E27FC236}">
+                <a16:creationId xmlns:a16="http://schemas.microsoft.com/office/drawing/2014/main" id="{141ADF94-C0E4-5710-B666-4849E7482636}"/>
+              </a:ext>
+            </a:extLst>
+          </p:cNvPr>
+          <p:cNvSpPr txBox="1"/>
+          <p:nvPr/>
+        </p:nvSpPr>
+        <p:spPr>
+          <a:xfrm>
+            <a:off x="2773680" y="280034"/>
+            <a:ext cx="5034680" cy="9788640"/>
+          </a:xfrm>
+          <a:prstGeom prst="rect">
+            <a:avLst/>
+          </a:prstGeom>
+          <a:solidFill>
+            <a:schemeClr val="bg1">
+              <a:lumMod val="95000"/>
+            </a:schemeClr>
+          </a:solidFill>
+          <a:ln>
+            <a:solidFill>
+              <a:schemeClr val="tx1"/>
+            </a:solidFill>
+            <a:prstDash val="solid"/>
+          </a:ln>
+        </p:spPr>
+        <p:txBody>
+          <a:bodyPr wrap="square" rtlCol="0">
+            <a:noAutofit/>
+          </a:bodyPr>
+          <a:lstStyle/>
+          <a:p>
+            <a:r>
+              <a:rPr lang="en-GB" sz="1400" b="1" dirty="0"/>
+              <a:t>Bundle (type=message)</a:t>
+            </a:r>
+          </a:p>
+        </p:txBody>
+      </p:sp>
+      <p:sp>
+        <p:nvSpPr>
+          <p:cNvPr id="82" name="TextBox 81">
+            <a:extLst>
+              <a:ext uri="{FF2B5EF4-FFF2-40B4-BE49-F238E27FC236}">
+                <a16:creationId xmlns:a16="http://schemas.microsoft.com/office/drawing/2014/main" id="{50016059-4F08-ABAA-48F1-8F8173311A9E}"/>
+              </a:ext>
+            </a:extLst>
+          </p:cNvPr>
+          <p:cNvSpPr txBox="1"/>
+          <p:nvPr/>
+        </p:nvSpPr>
+        <p:spPr>
+          <a:xfrm>
+            <a:off x="3103935" y="3691144"/>
+            <a:ext cx="3861944" cy="6223418"/>
+          </a:xfrm>
+          <a:prstGeom prst="rect">
+            <a:avLst/>
+          </a:prstGeom>
+          <a:solidFill>
+            <a:schemeClr val="accent1">
+              <a:lumMod val="20000"/>
+              <a:lumOff val="80000"/>
+            </a:schemeClr>
+          </a:solidFill>
+          <a:ln>
+            <a:solidFill>
+              <a:schemeClr val="tx1"/>
+            </a:solidFill>
+            <a:prstDash val="solid"/>
+          </a:ln>
+        </p:spPr>
+        <p:txBody>
+          <a:bodyPr wrap="square" rtlCol="0">
+            <a:noAutofit/>
+          </a:bodyPr>
+          <a:lstStyle/>
+          <a:p>
+            <a:r>
+              <a:rPr lang="en-GB" sz="1400" b="1" dirty="0"/>
+              <a:t>Bundle (type=document)</a:t>
+            </a:r>
+          </a:p>
+        </p:txBody>
+      </p:sp>
+      <p:sp>
+        <p:nvSpPr>
+          <p:cNvPr id="90" name="TextBox 89">
+            <a:extLst>
+              <a:ext uri="{FF2B5EF4-FFF2-40B4-BE49-F238E27FC236}">
+                <a16:creationId xmlns:a16="http://schemas.microsoft.com/office/drawing/2014/main" id="{8ABEA4C2-DCB7-D2DE-73DC-AC1DC7CABE35}"/>
+              </a:ext>
+            </a:extLst>
+          </p:cNvPr>
+          <p:cNvSpPr txBox="1"/>
+          <p:nvPr/>
+        </p:nvSpPr>
+        <p:spPr>
+          <a:xfrm>
+            <a:off x="3566274" y="9044944"/>
+            <a:ext cx="2834525" cy="664136"/>
+          </a:xfrm>
+          <a:prstGeom prst="rect">
+            <a:avLst/>
+          </a:prstGeom>
+          <a:solidFill>
+            <a:schemeClr val="accent6">
+              <a:lumMod val="40000"/>
+              <a:lumOff val="60000"/>
+            </a:schemeClr>
+          </a:solidFill>
+          <a:ln>
+            <a:solidFill>
+              <a:schemeClr val="tx1"/>
+            </a:solidFill>
+            <a:prstDash val="solid"/>
+          </a:ln>
+        </p:spPr>
+        <p:txBody>
+          <a:bodyPr wrap="square" rtlCol="0">
+            <a:noAutofit/>
+          </a:bodyPr>
+          <a:lstStyle/>
+          <a:p>
+            <a:pPr>
+              <a:spcAft>
+                <a:spcPts val="300"/>
+              </a:spcAft>
+            </a:pPr>
+            <a:endParaRPr lang="en-GB" sz="1400" b="1" dirty="0">
+              <a:solidFill>
+                <a:srgbClr val="FF0000"/>
+              </a:solidFill>
+            </a:endParaRPr>
+          </a:p>
+        </p:txBody>
+      </p:sp>
+      <p:sp>
+        <p:nvSpPr>
+          <p:cNvPr id="89" name="TextBox 88">
+            <a:extLst>
+              <a:ext uri="{FF2B5EF4-FFF2-40B4-BE49-F238E27FC236}">
+                <a16:creationId xmlns:a16="http://schemas.microsoft.com/office/drawing/2014/main" id="{0B9E2603-AB6D-38F0-8770-1D6855A7653A}"/>
+              </a:ext>
+            </a:extLst>
+          </p:cNvPr>
+          <p:cNvSpPr txBox="1"/>
+          <p:nvPr/>
+        </p:nvSpPr>
+        <p:spPr>
+          <a:xfrm>
+            <a:off x="3413874" y="8892544"/>
+            <a:ext cx="2834525" cy="664136"/>
+          </a:xfrm>
+          <a:prstGeom prst="rect">
+            <a:avLst/>
+          </a:prstGeom>
+          <a:solidFill>
+            <a:schemeClr val="accent6">
+              <a:lumMod val="40000"/>
+              <a:lumOff val="60000"/>
+            </a:schemeClr>
+          </a:solidFill>
+          <a:ln>
+            <a:solidFill>
+              <a:schemeClr val="tx1"/>
+            </a:solidFill>
+            <a:prstDash val="solid"/>
+          </a:ln>
+        </p:spPr>
+        <p:txBody>
+          <a:bodyPr wrap="square" rtlCol="0">
+            <a:noAutofit/>
+          </a:bodyPr>
+          <a:lstStyle/>
+          <a:p>
+            <a:pPr>
+              <a:spcAft>
+                <a:spcPts val="300"/>
+              </a:spcAft>
+            </a:pPr>
+            <a:endParaRPr lang="en-GB" sz="1400" b="1" dirty="0">
+              <a:solidFill>
+                <a:srgbClr val="FF0000"/>
+              </a:solidFill>
+            </a:endParaRPr>
+          </a:p>
+        </p:txBody>
+      </p:sp>
+      <p:sp>
+        <p:nvSpPr>
+          <p:cNvPr id="87" name="TextBox 86">
+            <a:extLst>
+              <a:ext uri="{FF2B5EF4-FFF2-40B4-BE49-F238E27FC236}">
+                <a16:creationId xmlns:a16="http://schemas.microsoft.com/office/drawing/2014/main" id="{633285A9-EA90-C403-AC5D-DCECCE744981}"/>
+              </a:ext>
+            </a:extLst>
+          </p:cNvPr>
+          <p:cNvSpPr txBox="1"/>
+          <p:nvPr/>
+        </p:nvSpPr>
+        <p:spPr>
+          <a:xfrm>
+            <a:off x="3261474" y="8740144"/>
+            <a:ext cx="2834525" cy="664136"/>
+          </a:xfrm>
+          <a:prstGeom prst="rect">
+            <a:avLst/>
+          </a:prstGeom>
+          <a:solidFill>
+            <a:schemeClr val="accent6">
+              <a:lumMod val="40000"/>
+              <a:lumOff val="60000"/>
+            </a:schemeClr>
+          </a:solidFill>
+          <a:ln>
+            <a:solidFill>
+              <a:schemeClr val="tx1"/>
+            </a:solidFill>
+            <a:prstDash val="solid"/>
+          </a:ln>
+        </p:spPr>
+        <p:txBody>
+          <a:bodyPr wrap="square" rtlCol="0">
+            <a:noAutofit/>
+          </a:bodyPr>
+          <a:lstStyle/>
+          <a:p>
+            <a:pPr>
+              <a:spcAft>
+                <a:spcPts val="300"/>
+              </a:spcAft>
+            </a:pPr>
+            <a:r>
+              <a:rPr lang="en-GB" sz="1400" b="1" dirty="0">
+                <a:solidFill>
+                  <a:srgbClr val="FF0000"/>
+                </a:solidFill>
+              </a:rPr>
+              <a:t>Observation</a:t>
+            </a:r>
+          </a:p>
+        </p:txBody>
+      </p:sp>
+      <p:sp>
+        <p:nvSpPr>
+          <p:cNvPr id="76" name="TextBox 75">
+            <a:extLst>
+              <a:ext uri="{FF2B5EF4-FFF2-40B4-BE49-F238E27FC236}">
+                <a16:creationId xmlns:a16="http://schemas.microsoft.com/office/drawing/2014/main" id="{00465ECB-A6E3-9761-28FA-883ECDCFC10B}"/>
+              </a:ext>
+            </a:extLst>
+          </p:cNvPr>
+          <p:cNvSpPr txBox="1"/>
+          <p:nvPr/>
+        </p:nvSpPr>
+        <p:spPr>
+          <a:xfrm>
+            <a:off x="3103936" y="695795"/>
+            <a:ext cx="3861947" cy="992579"/>
+          </a:xfrm>
+          <a:prstGeom prst="rect">
+            <a:avLst/>
+          </a:prstGeom>
+          <a:solidFill>
+            <a:schemeClr val="accent1">
+              <a:lumMod val="20000"/>
+              <a:lumOff val="80000"/>
+            </a:schemeClr>
+          </a:solidFill>
+          <a:ln>
+            <a:solidFill>
+              <a:schemeClr val="tx1"/>
+            </a:solidFill>
+            <a:prstDash val="solid"/>
+          </a:ln>
+        </p:spPr>
+        <p:txBody>
+          <a:bodyPr wrap="square" rtlCol="0">
+            <a:spAutoFit/>
+          </a:bodyPr>
+          <a:lstStyle/>
+          <a:p>
+            <a:pPr>
+              <a:spcAft>
+                <a:spcPts val="300"/>
+              </a:spcAft>
+            </a:pPr>
+            <a:r>
+              <a:rPr lang="en-GB" sz="1400" b="1" dirty="0" err="1"/>
+              <a:t>MessageHeader</a:t>
+            </a:r>
+            <a:endParaRPr lang="en-GB" sz="1400" b="1" dirty="0"/>
+          </a:p>
+          <a:p>
+            <a:pPr marL="742950" lvl="1" indent="-285750">
+              <a:buFont typeface="Arial" panose="020B0604020202020204" pitchFamily="34" charset="0"/>
+              <a:buChar char="•"/>
+            </a:pPr>
+            <a:r>
+              <a:rPr lang="en-GB" sz="1400" dirty="0"/>
+              <a:t>Sender</a:t>
+            </a:r>
+          </a:p>
+          <a:p>
+            <a:pPr marL="742950" lvl="1" indent="-285750">
+              <a:buFont typeface="Arial" panose="020B0604020202020204" pitchFamily="34" charset="0"/>
+              <a:buChar char="•"/>
+            </a:pPr>
+            <a:r>
+              <a:rPr lang="en-GB" sz="1400" dirty="0"/>
+              <a:t>Receiver</a:t>
+            </a:r>
+          </a:p>
+          <a:p>
+            <a:pPr marL="742950" lvl="1" indent="-285750">
+              <a:buFont typeface="Arial" panose="020B0604020202020204" pitchFamily="34" charset="0"/>
+              <a:buChar char="•"/>
+            </a:pPr>
+            <a:r>
+              <a:rPr lang="en-GB" sz="1400" dirty="0"/>
+              <a:t>Focus</a:t>
+            </a:r>
+          </a:p>
+        </p:txBody>
+      </p:sp>
+      <p:sp>
+        <p:nvSpPr>
+          <p:cNvPr id="77" name="TextBox 76">
+            <a:extLst>
+              <a:ext uri="{FF2B5EF4-FFF2-40B4-BE49-F238E27FC236}">
+                <a16:creationId xmlns:a16="http://schemas.microsoft.com/office/drawing/2014/main" id="{F4E7C02D-544A-5443-FB28-DF731E0CE60D}"/>
+              </a:ext>
+            </a:extLst>
+          </p:cNvPr>
+          <p:cNvSpPr txBox="1"/>
+          <p:nvPr/>
+        </p:nvSpPr>
+        <p:spPr>
+          <a:xfrm>
+            <a:off x="3103936" y="1783143"/>
+            <a:ext cx="3861947" cy="307777"/>
+          </a:xfrm>
+          <a:prstGeom prst="rect">
+            <a:avLst/>
+          </a:prstGeom>
+          <a:solidFill>
+            <a:schemeClr val="accent1">
+              <a:lumMod val="20000"/>
+              <a:lumOff val="80000"/>
+            </a:schemeClr>
+          </a:solidFill>
+          <a:ln>
+            <a:solidFill>
+              <a:schemeClr val="tx1"/>
+            </a:solidFill>
+            <a:prstDash val="solid"/>
+          </a:ln>
+        </p:spPr>
+        <p:txBody>
+          <a:bodyPr wrap="square" rtlCol="0">
+            <a:spAutoFit/>
+          </a:bodyPr>
+          <a:lstStyle/>
+          <a:p>
+            <a:pPr>
+              <a:spcAft>
+                <a:spcPts val="300"/>
+              </a:spcAft>
+            </a:pPr>
+            <a:r>
+              <a:rPr lang="en-GB" sz="1400" b="1" dirty="0"/>
+              <a:t>Organisation </a:t>
+            </a:r>
+            <a:r>
+              <a:rPr lang="en-GB" sz="1400" dirty="0"/>
+              <a:t>(Hospital)</a:t>
+            </a:r>
+          </a:p>
+        </p:txBody>
+      </p:sp>
+      <p:sp>
+        <p:nvSpPr>
+          <p:cNvPr id="79" name="TextBox 78">
+            <a:extLst>
+              <a:ext uri="{FF2B5EF4-FFF2-40B4-BE49-F238E27FC236}">
+                <a16:creationId xmlns:a16="http://schemas.microsoft.com/office/drawing/2014/main" id="{587E1568-A79A-121C-BCC4-6A2309CB5339}"/>
+              </a:ext>
+            </a:extLst>
+          </p:cNvPr>
+          <p:cNvSpPr txBox="1"/>
+          <p:nvPr/>
+        </p:nvSpPr>
+        <p:spPr>
+          <a:xfrm>
+            <a:off x="3103935" y="2211497"/>
+            <a:ext cx="3861947" cy="307777"/>
+          </a:xfrm>
+          <a:prstGeom prst="rect">
+            <a:avLst/>
+          </a:prstGeom>
+          <a:solidFill>
+            <a:schemeClr val="accent1">
+              <a:lumMod val="20000"/>
+              <a:lumOff val="80000"/>
+            </a:schemeClr>
+          </a:solidFill>
+          <a:ln>
+            <a:solidFill>
+              <a:schemeClr val="tx1"/>
+            </a:solidFill>
+            <a:prstDash val="solid"/>
+          </a:ln>
+        </p:spPr>
+        <p:txBody>
+          <a:bodyPr wrap="square" rtlCol="0">
+            <a:spAutoFit/>
+          </a:bodyPr>
+          <a:lstStyle/>
+          <a:p>
+            <a:pPr>
+              <a:spcAft>
+                <a:spcPts val="300"/>
+              </a:spcAft>
+            </a:pPr>
+            <a:r>
+              <a:rPr lang="en-GB" sz="1400" b="1" dirty="0"/>
+              <a:t>Organisation </a:t>
+            </a:r>
+            <a:r>
+              <a:rPr lang="en-GB" sz="1400" dirty="0"/>
+              <a:t>(Ambulance Service)</a:t>
+            </a:r>
+          </a:p>
+        </p:txBody>
+      </p:sp>
+      <p:grpSp>
+        <p:nvGrpSpPr>
+          <p:cNvPr id="22" name="Group 21">
+            <a:extLst>
+              <a:ext uri="{FF2B5EF4-FFF2-40B4-BE49-F238E27FC236}">
+                <a16:creationId xmlns:a16="http://schemas.microsoft.com/office/drawing/2014/main" id="{C7E7D9DF-51EE-E599-0740-11641367F03F}"/>
+              </a:ext>
+            </a:extLst>
+          </p:cNvPr>
+          <p:cNvGrpSpPr/>
+          <p:nvPr/>
+        </p:nvGrpSpPr>
+        <p:grpSpPr>
+          <a:xfrm>
+            <a:off x="3103935" y="2519487"/>
+            <a:ext cx="3861947" cy="7033388"/>
+            <a:chOff x="3103935" y="2971543"/>
+            <a:chExt cx="2834527" cy="7033388"/>
+          </a:xfrm>
+        </p:grpSpPr>
+        <p:sp>
+          <p:nvSpPr>
+            <p:cNvPr id="80" name="TextBox 79">
+              <a:extLst>
+                <a:ext uri="{FF2B5EF4-FFF2-40B4-BE49-F238E27FC236}">
+                  <a16:creationId xmlns:a16="http://schemas.microsoft.com/office/drawing/2014/main" id="{1EEFA7A2-2F8F-3315-A086-CE605A904C8A}"/>
+                </a:ext>
+              </a:extLst>
+            </p:cNvPr>
+            <p:cNvSpPr txBox="1"/>
+            <p:nvPr/>
+          </p:nvSpPr>
+          <p:spPr>
+            <a:xfrm>
+              <a:off x="3103935" y="3094007"/>
+              <a:ext cx="2834527" cy="926516"/>
+            </a:xfrm>
+            <a:prstGeom prst="rect">
+              <a:avLst/>
+            </a:prstGeom>
+            <a:solidFill>
+              <a:schemeClr val="accent1">
+                <a:lumMod val="20000"/>
+                <a:lumOff val="80000"/>
+              </a:schemeClr>
+            </a:solidFill>
+            <a:ln>
+              <a:solidFill>
+                <a:schemeClr val="tx1"/>
+              </a:solidFill>
+              <a:prstDash val="solid"/>
+            </a:ln>
+          </p:spPr>
+          <p:txBody>
+            <a:bodyPr wrap="square" rtlCol="0">
+              <a:noAutofit/>
+            </a:bodyPr>
+            <a:lstStyle/>
+            <a:p>
+              <a:pPr>
+                <a:spcAft>
+                  <a:spcPts val="300"/>
+                </a:spcAft>
+              </a:pPr>
+              <a:r>
+                <a:rPr lang="en-GB" sz="1400" b="1" dirty="0">
+                  <a:solidFill>
+                    <a:srgbClr val="FF0000"/>
+                  </a:solidFill>
+                </a:rPr>
+                <a:t>Document Reference </a:t>
+              </a:r>
+              <a:endParaRPr lang="en-GB" sz="1400" dirty="0">
+                <a:solidFill>
+                  <a:srgbClr val="FF0000"/>
+                </a:solidFill>
+              </a:endParaRPr>
+            </a:p>
+          </p:txBody>
+        </p:sp>
+        <p:pic>
+          <p:nvPicPr>
+            <p:cNvPr id="1026" name="Picture 2" descr="Image result for pdf icon">
+              <a:extLst>
+                <a:ext uri="{FF2B5EF4-FFF2-40B4-BE49-F238E27FC236}">
+                  <a16:creationId xmlns:a16="http://schemas.microsoft.com/office/drawing/2014/main" id="{FE0135A9-B705-7639-DAEF-999259E718E3}"/>
+                </a:ext>
+              </a:extLst>
+            </p:cNvPr>
+            <p:cNvPicPr>
+              <a:picLocks noChangeAspect="1" noChangeArrowheads="1"/>
+            </p:cNvPicPr>
+            <p:nvPr/>
+          </p:nvPicPr>
+          <p:blipFill>
+            <a:blip r:embed="rId2">
+              <a:extLst>
+                <a:ext uri="{28A0092B-C50C-407E-A947-70E740481C1C}">
+                  <a14:useLocalDpi xmlns:a14="http://schemas.microsoft.com/office/drawing/2010/main" val="0"/>
+                </a:ext>
+              </a:extLst>
+            </a:blip>
+            <a:srcRect/>
+            <a:stretch>
+              <a:fillRect/>
+            </a:stretch>
+          </p:blipFill>
+          <p:spPr bwMode="auto">
+            <a:xfrm>
+              <a:off x="4347555" y="3516944"/>
+              <a:ext cx="271255" cy="425916"/>
+            </a:xfrm>
+            <a:prstGeom prst="rect">
+              <a:avLst/>
+            </a:prstGeom>
+            <a:noFill/>
+            <a:extLst>
+              <a:ext uri="{909E8E84-426E-40DD-AFC4-6F175D3DCCD1}">
+                <a14:hiddenFill xmlns:a14="http://schemas.microsoft.com/office/drawing/2010/main">
+                  <a:solidFill>
+                    <a:srgbClr val="FFFFFF"/>
+                  </a:solidFill>
+                </a14:hiddenFill>
+              </a:ext>
+            </a:extLst>
+          </p:spPr>
+        </p:pic>
+        <p:sp>
+          <p:nvSpPr>
+            <p:cNvPr id="3" name="TextBox 2">
+              <a:extLst>
+                <a:ext uri="{FF2B5EF4-FFF2-40B4-BE49-F238E27FC236}">
+                  <a16:creationId xmlns:a16="http://schemas.microsoft.com/office/drawing/2014/main" id="{F54FC6B4-5027-0AB4-156C-35995D8C9802}"/>
+                </a:ext>
+              </a:extLst>
+            </p:cNvPr>
+            <p:cNvSpPr txBox="1"/>
+            <p:nvPr/>
+          </p:nvSpPr>
+          <p:spPr>
+            <a:xfrm rot="18255413">
+              <a:off x="4773867" y="3340257"/>
+              <a:ext cx="1229871" cy="492443"/>
+            </a:xfrm>
+            <a:prstGeom prst="rect">
+              <a:avLst/>
+            </a:prstGeom>
+            <a:noFill/>
+          </p:spPr>
+          <p:txBody>
+            <a:bodyPr wrap="square" rtlCol="0">
+              <a:spAutoFit/>
+            </a:bodyPr>
+            <a:lstStyle/>
+            <a:p>
+              <a:pPr algn="ctr"/>
+              <a:r>
+                <a:rPr lang="en-GB" sz="1300" b="1" dirty="0">
+                  <a:solidFill>
+                    <a:srgbClr val="FF0000"/>
+                  </a:solidFill>
+                </a:rPr>
+                <a:t>Finalisation Only</a:t>
+              </a:r>
+            </a:p>
+          </p:txBody>
+        </p:sp>
+        <p:sp>
+          <p:nvSpPr>
+            <p:cNvPr id="88" name="TextBox 87">
+              <a:extLst>
+                <a:ext uri="{FF2B5EF4-FFF2-40B4-BE49-F238E27FC236}">
+                  <a16:creationId xmlns:a16="http://schemas.microsoft.com/office/drawing/2014/main" id="{19BE61D6-1E66-0612-F960-90DD051F8513}"/>
+                </a:ext>
+              </a:extLst>
+            </p:cNvPr>
+            <p:cNvSpPr txBox="1"/>
+            <p:nvPr/>
+          </p:nvSpPr>
+          <p:spPr>
+            <a:xfrm rot="19673739">
+              <a:off x="4503264" y="9333994"/>
+              <a:ext cx="902680" cy="670937"/>
+            </a:xfrm>
+            <a:prstGeom prst="rect">
+              <a:avLst/>
+            </a:prstGeom>
+            <a:noFill/>
+          </p:spPr>
+          <p:txBody>
+            <a:bodyPr wrap="square" rtlCol="0">
+              <a:spAutoFit/>
+            </a:bodyPr>
+            <a:lstStyle/>
+            <a:p>
+              <a:pPr algn="ctr"/>
+              <a:r>
+                <a:rPr lang="en-GB" sz="1300" b="1" dirty="0">
+                  <a:solidFill>
+                    <a:srgbClr val="FF0000"/>
+                  </a:solidFill>
+                </a:rPr>
+                <a:t>Finalisation Only</a:t>
+              </a:r>
+            </a:p>
+          </p:txBody>
+        </p:sp>
+      </p:grpSp>
+      <p:sp>
+        <p:nvSpPr>
+          <p:cNvPr id="83" name="TextBox 82">
+            <a:extLst>
+              <a:ext uri="{FF2B5EF4-FFF2-40B4-BE49-F238E27FC236}">
+                <a16:creationId xmlns:a16="http://schemas.microsoft.com/office/drawing/2014/main" id="{38A89EB5-DD11-627F-069C-8C4441DC03CB}"/>
+              </a:ext>
+            </a:extLst>
+          </p:cNvPr>
+          <p:cNvSpPr txBox="1"/>
+          <p:nvPr/>
+        </p:nvSpPr>
+        <p:spPr>
+          <a:xfrm>
+            <a:off x="3261475" y="4057348"/>
+            <a:ext cx="2834525" cy="1901663"/>
+          </a:xfrm>
+          <a:prstGeom prst="rect">
+            <a:avLst/>
+          </a:prstGeom>
+          <a:solidFill>
+            <a:schemeClr val="accent6">
+              <a:lumMod val="40000"/>
+              <a:lumOff val="60000"/>
+            </a:schemeClr>
+          </a:solidFill>
+          <a:ln>
+            <a:solidFill>
+              <a:schemeClr val="tx1"/>
+            </a:solidFill>
+            <a:prstDash val="solid"/>
+          </a:ln>
+        </p:spPr>
+        <p:txBody>
+          <a:bodyPr wrap="square" rtlCol="0">
+            <a:noAutofit/>
+          </a:bodyPr>
+          <a:lstStyle/>
+          <a:p>
+            <a:pPr>
+              <a:spcAft>
+                <a:spcPts val="300"/>
+              </a:spcAft>
+            </a:pPr>
+            <a:r>
+              <a:rPr lang="en-GB" sz="1400" b="1" dirty="0"/>
+              <a:t>Composition</a:t>
+            </a:r>
+          </a:p>
+          <a:p>
+            <a:pPr marL="285750" indent="-285750">
+              <a:buFont typeface="Arial" panose="020B0604020202020204" pitchFamily="34" charset="0"/>
+              <a:buChar char="•"/>
+            </a:pPr>
+            <a:r>
+              <a:rPr lang="en-GB" sz="1400" dirty="0"/>
+              <a:t>Subject</a:t>
+            </a:r>
+          </a:p>
+          <a:p>
+            <a:pPr marL="285750" indent="-285750">
+              <a:buFont typeface="Arial" panose="020B0604020202020204" pitchFamily="34" charset="0"/>
+              <a:buChar char="•"/>
+            </a:pPr>
+            <a:r>
+              <a:rPr lang="en-GB" sz="1400" dirty="0"/>
+              <a:t>Encounter</a:t>
+            </a:r>
+          </a:p>
+          <a:p>
+            <a:r>
+              <a:rPr lang="en-GB" sz="1400" dirty="0"/>
+              <a:t>Sections</a:t>
+            </a:r>
+          </a:p>
+          <a:p>
+            <a:pPr marL="285750" indent="-285750">
+              <a:buFont typeface="Arial" panose="020B0604020202020204" pitchFamily="34" charset="0"/>
+              <a:buChar char="•"/>
+            </a:pPr>
+            <a:r>
+              <a:rPr lang="en-GB" sz="1400" dirty="0"/>
+              <a:t>Incident details</a:t>
+            </a:r>
+          </a:p>
+          <a:p>
+            <a:pPr marL="285750" indent="-285750">
+              <a:buFont typeface="Arial" panose="020B0604020202020204" pitchFamily="34" charset="0"/>
+              <a:buChar char="•"/>
+            </a:pPr>
+            <a:r>
+              <a:rPr lang="en-GB" sz="1400" dirty="0"/>
+              <a:t>Patient demographics</a:t>
+            </a:r>
+          </a:p>
+          <a:p>
+            <a:pPr marL="285750" indent="-285750">
+              <a:buFont typeface="Arial" panose="020B0604020202020204" pitchFamily="34" charset="0"/>
+              <a:buChar char="•"/>
+            </a:pPr>
+            <a:r>
+              <a:rPr lang="en-GB" sz="1400" dirty="0"/>
+              <a:t>GP Practice</a:t>
+            </a:r>
+          </a:p>
+          <a:p>
+            <a:pPr marL="285750" indent="-285750">
+              <a:buFont typeface="Arial" panose="020B0604020202020204" pitchFamily="34" charset="0"/>
+              <a:buChar char="•"/>
+            </a:pPr>
+            <a:r>
+              <a:rPr lang="en-GB" sz="1400" dirty="0">
+                <a:solidFill>
+                  <a:srgbClr val="FF0000"/>
+                </a:solidFill>
+              </a:rPr>
+              <a:t>Observations</a:t>
+            </a:r>
+          </a:p>
+        </p:txBody>
+      </p:sp>
+      <p:sp>
+        <p:nvSpPr>
+          <p:cNvPr id="84" name="TextBox 83">
+            <a:extLst>
+              <a:ext uri="{FF2B5EF4-FFF2-40B4-BE49-F238E27FC236}">
+                <a16:creationId xmlns:a16="http://schemas.microsoft.com/office/drawing/2014/main" id="{987D382B-4561-EBFB-721F-F3A2B7A1E1DD}"/>
+              </a:ext>
+            </a:extLst>
+          </p:cNvPr>
+          <p:cNvSpPr txBox="1"/>
+          <p:nvPr/>
+        </p:nvSpPr>
+        <p:spPr>
+          <a:xfrm>
+            <a:off x="3261474" y="6122061"/>
+            <a:ext cx="2834525" cy="526639"/>
+          </a:xfrm>
+          <a:prstGeom prst="rect">
+            <a:avLst/>
+          </a:prstGeom>
+          <a:solidFill>
+            <a:schemeClr val="accent6">
+              <a:lumMod val="40000"/>
+              <a:lumOff val="60000"/>
+            </a:schemeClr>
+          </a:solidFill>
+          <a:ln>
+            <a:solidFill>
+              <a:schemeClr val="tx1"/>
+            </a:solidFill>
+            <a:prstDash val="solid"/>
+          </a:ln>
+        </p:spPr>
+        <p:txBody>
+          <a:bodyPr wrap="square" rtlCol="0">
+            <a:noAutofit/>
+          </a:bodyPr>
+          <a:lstStyle/>
+          <a:p>
+            <a:pPr>
+              <a:spcAft>
+                <a:spcPts val="300"/>
+              </a:spcAft>
+            </a:pPr>
+            <a:r>
+              <a:rPr lang="en-GB" sz="1400" b="1" dirty="0"/>
+              <a:t>Patient</a:t>
+            </a:r>
+          </a:p>
+        </p:txBody>
+      </p:sp>
+      <p:sp>
+        <p:nvSpPr>
+          <p:cNvPr id="85" name="TextBox 84">
+            <a:extLst>
+              <a:ext uri="{FF2B5EF4-FFF2-40B4-BE49-F238E27FC236}">
+                <a16:creationId xmlns:a16="http://schemas.microsoft.com/office/drawing/2014/main" id="{813798D2-A802-262F-95FB-114618E04A8C}"/>
+              </a:ext>
+            </a:extLst>
+          </p:cNvPr>
+          <p:cNvSpPr txBox="1"/>
+          <p:nvPr/>
+        </p:nvSpPr>
+        <p:spPr>
+          <a:xfrm>
+            <a:off x="3261474" y="6772148"/>
+            <a:ext cx="2834525" cy="526639"/>
+          </a:xfrm>
+          <a:prstGeom prst="rect">
+            <a:avLst/>
+          </a:prstGeom>
+          <a:solidFill>
+            <a:schemeClr val="accent6">
+              <a:lumMod val="40000"/>
+              <a:lumOff val="60000"/>
+            </a:schemeClr>
+          </a:solidFill>
+          <a:ln>
+            <a:solidFill>
+              <a:schemeClr val="tx1"/>
+            </a:solidFill>
+            <a:prstDash val="solid"/>
+          </a:ln>
+        </p:spPr>
+        <p:txBody>
+          <a:bodyPr wrap="square" rtlCol="0">
+            <a:noAutofit/>
+          </a:bodyPr>
+          <a:lstStyle/>
+          <a:p>
+            <a:pPr>
+              <a:spcAft>
+                <a:spcPts val="300"/>
+              </a:spcAft>
+            </a:pPr>
+            <a:r>
+              <a:rPr lang="en-GB" sz="1400" b="1" dirty="0"/>
+              <a:t>Encounter</a:t>
+            </a:r>
+          </a:p>
+        </p:txBody>
+      </p:sp>
+      <p:sp>
+        <p:nvSpPr>
+          <p:cNvPr id="86" name="TextBox 85">
+            <a:extLst>
+              <a:ext uri="{FF2B5EF4-FFF2-40B4-BE49-F238E27FC236}">
+                <a16:creationId xmlns:a16="http://schemas.microsoft.com/office/drawing/2014/main" id="{D8C95D3A-DCC5-8987-0D55-2F51A198EF09}"/>
+              </a:ext>
+            </a:extLst>
+          </p:cNvPr>
+          <p:cNvSpPr txBox="1"/>
+          <p:nvPr/>
+        </p:nvSpPr>
+        <p:spPr>
+          <a:xfrm>
+            <a:off x="3261474" y="7422235"/>
+            <a:ext cx="2834525" cy="526639"/>
+          </a:xfrm>
+          <a:prstGeom prst="rect">
+            <a:avLst/>
+          </a:prstGeom>
+          <a:solidFill>
+            <a:schemeClr val="accent6">
+              <a:lumMod val="40000"/>
+              <a:lumOff val="60000"/>
+            </a:schemeClr>
+          </a:solidFill>
+          <a:ln>
+            <a:solidFill>
+              <a:schemeClr val="tx1"/>
+            </a:solidFill>
+            <a:prstDash val="solid"/>
+          </a:ln>
+        </p:spPr>
+        <p:txBody>
+          <a:bodyPr wrap="square" rtlCol="0">
+            <a:noAutofit/>
+          </a:bodyPr>
+          <a:lstStyle/>
+          <a:p>
+            <a:pPr>
+              <a:spcAft>
+                <a:spcPts val="300"/>
+              </a:spcAft>
+            </a:pPr>
+            <a:r>
+              <a:rPr lang="en-GB" sz="1400" b="1" dirty="0"/>
+              <a:t>GP Practitioner</a:t>
+            </a:r>
+          </a:p>
+        </p:txBody>
+      </p:sp>
+      <p:sp>
+        <p:nvSpPr>
+          <p:cNvPr id="26" name="Oval 25">
+            <a:extLst>
+              <a:ext uri="{FF2B5EF4-FFF2-40B4-BE49-F238E27FC236}">
+                <a16:creationId xmlns:a16="http://schemas.microsoft.com/office/drawing/2014/main" id="{95B63534-5020-3CD9-B9CA-E19748C3BE83}"/>
+              </a:ext>
+            </a:extLst>
+          </p:cNvPr>
+          <p:cNvSpPr/>
+          <p:nvPr/>
+        </p:nvSpPr>
+        <p:spPr>
+          <a:xfrm>
+            <a:off x="4370291" y="1026629"/>
+            <a:ext cx="243102" cy="149273"/>
+          </a:xfrm>
+          <a:prstGeom prst="ellipse">
+            <a:avLst/>
+          </a:prstGeom>
+          <a:noFill/>
+          <a:ln>
+            <a:noFill/>
+          </a:ln>
+        </p:spPr>
+        <p:style>
+          <a:lnRef idx="2">
+            <a:schemeClr val="accent1">
+              <a:shade val="50000"/>
+            </a:schemeClr>
+          </a:lnRef>
+          <a:fillRef idx="1">
+            <a:schemeClr val="accent1"/>
+          </a:fillRef>
+          <a:effectRef idx="0">
+            <a:schemeClr val="accent1"/>
+          </a:effectRef>
+          <a:fontRef idx="minor">
+            <a:schemeClr val="lt1"/>
+          </a:fontRef>
+        </p:style>
+        <p:txBody>
+          <a:bodyPr rtlCol="0" anchor="ctr"/>
+          <a:lstStyle/>
+          <a:p>
+            <a:pPr algn="ctr"/>
+            <a:endParaRPr lang="en-GB"/>
+          </a:p>
+        </p:txBody>
+      </p:sp>
+      <p:sp>
+        <p:nvSpPr>
+          <p:cNvPr id="92" name="Oval 91">
+            <a:extLst>
+              <a:ext uri="{FF2B5EF4-FFF2-40B4-BE49-F238E27FC236}">
+                <a16:creationId xmlns:a16="http://schemas.microsoft.com/office/drawing/2014/main" id="{392CF0E7-1871-BC92-BB67-4EEB23779F4B}"/>
+              </a:ext>
+            </a:extLst>
+          </p:cNvPr>
+          <p:cNvSpPr/>
+          <p:nvPr/>
+        </p:nvSpPr>
+        <p:spPr>
+          <a:xfrm>
+            <a:off x="4505842" y="1260617"/>
+            <a:ext cx="243102" cy="149273"/>
+          </a:xfrm>
+          <a:prstGeom prst="ellipse">
+            <a:avLst/>
+          </a:prstGeom>
+          <a:noFill/>
+          <a:ln>
+            <a:noFill/>
+          </a:ln>
+        </p:spPr>
+        <p:style>
+          <a:lnRef idx="2">
+            <a:schemeClr val="accent1">
+              <a:shade val="50000"/>
+            </a:schemeClr>
+          </a:lnRef>
+          <a:fillRef idx="1">
+            <a:schemeClr val="accent1"/>
+          </a:fillRef>
+          <a:effectRef idx="0">
+            <a:schemeClr val="accent1"/>
+          </a:effectRef>
+          <a:fontRef idx="minor">
+            <a:schemeClr val="lt1"/>
+          </a:fontRef>
+        </p:style>
+        <p:txBody>
+          <a:bodyPr rtlCol="0" anchor="ctr"/>
+          <a:lstStyle/>
+          <a:p>
+            <a:pPr algn="ctr"/>
+            <a:endParaRPr lang="en-GB"/>
+          </a:p>
+        </p:txBody>
+      </p:sp>
+      <p:sp>
+        <p:nvSpPr>
+          <p:cNvPr id="93" name="Oval 92">
+            <a:extLst>
+              <a:ext uri="{FF2B5EF4-FFF2-40B4-BE49-F238E27FC236}">
+                <a16:creationId xmlns:a16="http://schemas.microsoft.com/office/drawing/2014/main" id="{34389FDE-E47F-FEBA-C68D-CF2AA3A7A242}"/>
+              </a:ext>
+            </a:extLst>
+          </p:cNvPr>
+          <p:cNvSpPr/>
+          <p:nvPr/>
+        </p:nvSpPr>
+        <p:spPr>
+          <a:xfrm>
+            <a:off x="4271526" y="1494605"/>
+            <a:ext cx="243102" cy="149273"/>
+          </a:xfrm>
+          <a:prstGeom prst="ellipse">
+            <a:avLst/>
+          </a:prstGeom>
+          <a:noFill/>
+          <a:ln>
+            <a:noFill/>
+          </a:ln>
+        </p:spPr>
+        <p:style>
+          <a:lnRef idx="2">
+            <a:schemeClr val="accent1">
+              <a:shade val="50000"/>
+            </a:schemeClr>
+          </a:lnRef>
+          <a:fillRef idx="1">
+            <a:schemeClr val="accent1"/>
+          </a:fillRef>
+          <a:effectRef idx="0">
+            <a:schemeClr val="accent1"/>
+          </a:effectRef>
+          <a:fontRef idx="minor">
+            <a:schemeClr val="lt1"/>
+          </a:fontRef>
+        </p:style>
+        <p:txBody>
+          <a:bodyPr rtlCol="0" anchor="ctr"/>
+          <a:lstStyle/>
+          <a:p>
+            <a:pPr algn="ctr"/>
+            <a:endParaRPr lang="en-GB"/>
+          </a:p>
+        </p:txBody>
+      </p:sp>
+      <p:cxnSp>
+        <p:nvCxnSpPr>
+          <p:cNvPr id="41" name="Connector: Elbow 40">
+            <a:extLst>
+              <a:ext uri="{FF2B5EF4-FFF2-40B4-BE49-F238E27FC236}">
+                <a16:creationId xmlns:a16="http://schemas.microsoft.com/office/drawing/2014/main" id="{D924F447-7971-37C8-578F-031773AA8B12}"/>
+              </a:ext>
+            </a:extLst>
+          </p:cNvPr>
+          <p:cNvCxnSpPr>
+            <a:cxnSpLocks/>
+            <a:stCxn id="26" idx="6"/>
+            <a:endCxn id="79" idx="3"/>
+          </p:cNvCxnSpPr>
+          <p:nvPr/>
+        </p:nvCxnSpPr>
+        <p:spPr>
+          <a:xfrm>
+            <a:off x="4613393" y="1101266"/>
+            <a:ext cx="2352489" cy="1264120"/>
+          </a:xfrm>
+          <a:prstGeom prst="bentConnector3">
+            <a:avLst>
+              <a:gd name="adj1" fmla="val 109717"/>
+            </a:avLst>
+          </a:prstGeom>
+          <a:ln>
+            <a:solidFill>
+              <a:schemeClr val="tx1"/>
+            </a:solidFill>
+            <a:prstDash val="lgDash"/>
+            <a:tailEnd type="triangle"/>
+          </a:ln>
+        </p:spPr>
+        <p:style>
+          <a:lnRef idx="1">
+            <a:schemeClr val="accent1"/>
+          </a:lnRef>
+          <a:fillRef idx="0">
+            <a:schemeClr val="accent1"/>
+          </a:fillRef>
+          <a:effectRef idx="0">
+            <a:schemeClr val="accent1"/>
+          </a:effectRef>
+          <a:fontRef idx="minor">
+            <a:schemeClr val="tx1"/>
+          </a:fontRef>
+        </p:style>
+      </p:cxnSp>
+      <p:cxnSp>
+        <p:nvCxnSpPr>
+          <p:cNvPr id="98" name="Connector: Elbow 97">
+            <a:extLst>
+              <a:ext uri="{FF2B5EF4-FFF2-40B4-BE49-F238E27FC236}">
+                <a16:creationId xmlns:a16="http://schemas.microsoft.com/office/drawing/2014/main" id="{AB931D1D-9D49-8951-C2E9-0178B4EBB416}"/>
+              </a:ext>
+            </a:extLst>
+          </p:cNvPr>
+          <p:cNvCxnSpPr>
+            <a:cxnSpLocks/>
+            <a:stCxn id="92" idx="6"/>
+            <a:endCxn id="77" idx="3"/>
+          </p:cNvCxnSpPr>
+          <p:nvPr/>
+        </p:nvCxnSpPr>
+        <p:spPr>
+          <a:xfrm>
+            <a:off x="4748944" y="1335254"/>
+            <a:ext cx="2216939" cy="601778"/>
+          </a:xfrm>
+          <a:prstGeom prst="bentConnector3">
+            <a:avLst>
+              <a:gd name="adj1" fmla="val 116800"/>
+            </a:avLst>
+          </a:prstGeom>
+          <a:ln>
+            <a:solidFill>
+              <a:schemeClr val="tx1"/>
+            </a:solidFill>
+            <a:prstDash val="lgDash"/>
+            <a:tailEnd type="triangle"/>
+          </a:ln>
+        </p:spPr>
+        <p:style>
+          <a:lnRef idx="1">
+            <a:schemeClr val="accent1"/>
+          </a:lnRef>
+          <a:fillRef idx="0">
+            <a:schemeClr val="accent1"/>
+          </a:fillRef>
+          <a:effectRef idx="0">
+            <a:schemeClr val="accent1"/>
+          </a:effectRef>
+          <a:fontRef idx="minor">
+            <a:schemeClr val="tx1"/>
+          </a:fontRef>
+        </p:style>
+      </p:cxnSp>
+      <p:cxnSp>
+        <p:nvCxnSpPr>
+          <p:cNvPr id="111" name="Connector: Elbow 110">
+            <a:extLst>
+              <a:ext uri="{FF2B5EF4-FFF2-40B4-BE49-F238E27FC236}">
+                <a16:creationId xmlns:a16="http://schemas.microsoft.com/office/drawing/2014/main" id="{0BE3C725-449A-9637-8EBC-B40B52D73555}"/>
+              </a:ext>
+            </a:extLst>
+          </p:cNvPr>
+          <p:cNvCxnSpPr>
+            <a:cxnSpLocks/>
+            <a:stCxn id="93" idx="6"/>
+            <a:endCxn id="80" idx="3"/>
+          </p:cNvCxnSpPr>
+          <p:nvPr/>
+        </p:nvCxnSpPr>
+        <p:spPr>
+          <a:xfrm>
+            <a:off x="4514628" y="1569242"/>
+            <a:ext cx="2451254" cy="1535967"/>
+          </a:xfrm>
+          <a:prstGeom prst="bentConnector3">
+            <a:avLst>
+              <a:gd name="adj1" fmla="val 119804"/>
+            </a:avLst>
+          </a:prstGeom>
+          <a:ln>
+            <a:solidFill>
+              <a:schemeClr val="tx1"/>
+            </a:solidFill>
+            <a:prstDash val="lgDash"/>
+            <a:tailEnd type="triangle"/>
+          </a:ln>
+        </p:spPr>
+        <p:style>
+          <a:lnRef idx="1">
+            <a:schemeClr val="accent1"/>
+          </a:lnRef>
+          <a:fillRef idx="0">
+            <a:schemeClr val="accent1"/>
+          </a:fillRef>
+          <a:effectRef idx="0">
+            <a:schemeClr val="accent1"/>
+          </a:effectRef>
+          <a:fontRef idx="minor">
+            <a:schemeClr val="tx1"/>
+          </a:fontRef>
+        </p:style>
+      </p:cxnSp>
+      <p:cxnSp>
+        <p:nvCxnSpPr>
+          <p:cNvPr id="112" name="Connector: Elbow 111">
+            <a:extLst>
+              <a:ext uri="{FF2B5EF4-FFF2-40B4-BE49-F238E27FC236}">
+                <a16:creationId xmlns:a16="http://schemas.microsoft.com/office/drawing/2014/main" id="{237D312D-B47F-C427-071B-11C473A725BE}"/>
+              </a:ext>
+            </a:extLst>
+          </p:cNvPr>
+          <p:cNvCxnSpPr>
+            <a:cxnSpLocks/>
+            <a:stCxn id="93" idx="6"/>
+            <a:endCxn id="82" idx="3"/>
+          </p:cNvCxnSpPr>
+          <p:nvPr/>
+        </p:nvCxnSpPr>
+        <p:spPr>
+          <a:xfrm>
+            <a:off x="4514628" y="1569242"/>
+            <a:ext cx="2451251" cy="5233611"/>
+          </a:xfrm>
+          <a:prstGeom prst="bentConnector3">
+            <a:avLst>
+              <a:gd name="adj1" fmla="val 109326"/>
+            </a:avLst>
+          </a:prstGeom>
+          <a:ln>
+            <a:solidFill>
+              <a:schemeClr val="tx1"/>
+            </a:solidFill>
+            <a:prstDash val="lgDash"/>
+            <a:tailEnd type="triangle"/>
+          </a:ln>
+        </p:spPr>
+        <p:style>
+          <a:lnRef idx="1">
+            <a:schemeClr val="accent1"/>
+          </a:lnRef>
+          <a:fillRef idx="0">
+            <a:schemeClr val="accent1"/>
+          </a:fillRef>
+          <a:effectRef idx="0">
+            <a:schemeClr val="accent1"/>
+          </a:effectRef>
+          <a:fontRef idx="minor">
+            <a:schemeClr val="tx1"/>
+          </a:fontRef>
+        </p:style>
+      </p:cxnSp>
+      <p:sp>
+        <p:nvSpPr>
+          <p:cNvPr id="113" name="Oval 112">
+            <a:extLst>
+              <a:ext uri="{FF2B5EF4-FFF2-40B4-BE49-F238E27FC236}">
+                <a16:creationId xmlns:a16="http://schemas.microsoft.com/office/drawing/2014/main" id="{2EC4086A-D8BF-8E39-CCCA-54782CE4AAA4}"/>
+              </a:ext>
+            </a:extLst>
+          </p:cNvPr>
+          <p:cNvSpPr/>
+          <p:nvPr/>
+        </p:nvSpPr>
+        <p:spPr>
+          <a:xfrm>
+            <a:off x="4106635" y="4391494"/>
+            <a:ext cx="243102" cy="149273"/>
+          </a:xfrm>
+          <a:prstGeom prst="ellipse">
+            <a:avLst/>
+          </a:prstGeom>
+          <a:noFill/>
+          <a:ln>
+            <a:noFill/>
+          </a:ln>
+        </p:spPr>
+        <p:style>
+          <a:lnRef idx="2">
+            <a:schemeClr val="accent1">
+              <a:shade val="50000"/>
+            </a:schemeClr>
+          </a:lnRef>
+          <a:fillRef idx="1">
+            <a:schemeClr val="accent1"/>
+          </a:fillRef>
+          <a:effectRef idx="0">
+            <a:schemeClr val="accent1"/>
+          </a:effectRef>
+          <a:fontRef idx="minor">
+            <a:schemeClr val="lt1"/>
+          </a:fontRef>
+        </p:style>
+        <p:txBody>
+          <a:bodyPr rtlCol="0" anchor="ctr"/>
+          <a:lstStyle/>
+          <a:p>
+            <a:pPr algn="ctr"/>
+            <a:endParaRPr lang="en-GB"/>
+          </a:p>
+        </p:txBody>
+      </p:sp>
+      <p:sp>
+        <p:nvSpPr>
+          <p:cNvPr id="114" name="Oval 113">
+            <a:extLst>
+              <a:ext uri="{FF2B5EF4-FFF2-40B4-BE49-F238E27FC236}">
+                <a16:creationId xmlns:a16="http://schemas.microsoft.com/office/drawing/2014/main" id="{E3C63DD5-B880-7A6B-94B3-B9ACD8156540}"/>
+              </a:ext>
+            </a:extLst>
+          </p:cNvPr>
+          <p:cNvSpPr/>
+          <p:nvPr/>
+        </p:nvSpPr>
+        <p:spPr>
+          <a:xfrm>
+            <a:off x="4235592" y="4597982"/>
+            <a:ext cx="243102" cy="149273"/>
+          </a:xfrm>
+          <a:prstGeom prst="ellipse">
+            <a:avLst/>
+          </a:prstGeom>
+          <a:noFill/>
+          <a:ln>
+            <a:noFill/>
+          </a:ln>
+        </p:spPr>
+        <p:style>
+          <a:lnRef idx="2">
+            <a:schemeClr val="accent1">
+              <a:shade val="50000"/>
+            </a:schemeClr>
+          </a:lnRef>
+          <a:fillRef idx="1">
+            <a:schemeClr val="accent1"/>
+          </a:fillRef>
+          <a:effectRef idx="0">
+            <a:schemeClr val="accent1"/>
+          </a:effectRef>
+          <a:fontRef idx="minor">
+            <a:schemeClr val="lt1"/>
+          </a:fontRef>
+        </p:style>
+        <p:txBody>
+          <a:bodyPr rtlCol="0" anchor="ctr"/>
+          <a:lstStyle/>
+          <a:p>
+            <a:pPr algn="ctr"/>
+            <a:endParaRPr lang="en-GB"/>
+          </a:p>
+        </p:txBody>
+      </p:sp>
+      <p:sp>
+        <p:nvSpPr>
+          <p:cNvPr id="115" name="Oval 114">
+            <a:extLst>
+              <a:ext uri="{FF2B5EF4-FFF2-40B4-BE49-F238E27FC236}">
+                <a16:creationId xmlns:a16="http://schemas.microsoft.com/office/drawing/2014/main" id="{BFE83398-A00C-E255-1D6B-4C23AA507FE5}"/>
+              </a:ext>
+            </a:extLst>
+          </p:cNvPr>
+          <p:cNvSpPr/>
+          <p:nvPr/>
+        </p:nvSpPr>
+        <p:spPr>
+          <a:xfrm>
+            <a:off x="4623667" y="5019321"/>
+            <a:ext cx="243102" cy="149273"/>
+          </a:xfrm>
+          <a:prstGeom prst="ellipse">
+            <a:avLst/>
+          </a:prstGeom>
+          <a:noFill/>
+          <a:ln>
+            <a:noFill/>
+          </a:ln>
+        </p:spPr>
+        <p:style>
+          <a:lnRef idx="2">
+            <a:schemeClr val="accent1">
+              <a:shade val="50000"/>
+            </a:schemeClr>
+          </a:lnRef>
+          <a:fillRef idx="1">
+            <a:schemeClr val="accent1"/>
+          </a:fillRef>
+          <a:effectRef idx="0">
+            <a:schemeClr val="accent1"/>
+          </a:effectRef>
+          <a:fontRef idx="minor">
+            <a:schemeClr val="lt1"/>
+          </a:fontRef>
+        </p:style>
+        <p:txBody>
+          <a:bodyPr rtlCol="0" anchor="ctr"/>
+          <a:lstStyle/>
+          <a:p>
+            <a:pPr algn="ctr"/>
+            <a:endParaRPr lang="en-GB"/>
+          </a:p>
+        </p:txBody>
+      </p:sp>
+      <p:sp>
+        <p:nvSpPr>
+          <p:cNvPr id="116" name="Oval 115">
+            <a:extLst>
+              <a:ext uri="{FF2B5EF4-FFF2-40B4-BE49-F238E27FC236}">
+                <a16:creationId xmlns:a16="http://schemas.microsoft.com/office/drawing/2014/main" id="{6DE68A03-06DA-3E4A-5C7D-93223447F6C0}"/>
+              </a:ext>
+            </a:extLst>
+          </p:cNvPr>
+          <p:cNvSpPr/>
+          <p:nvPr/>
+        </p:nvSpPr>
+        <p:spPr>
+          <a:xfrm>
+            <a:off x="5083879" y="5250153"/>
+            <a:ext cx="243102" cy="149273"/>
+          </a:xfrm>
+          <a:prstGeom prst="ellipse">
+            <a:avLst/>
+          </a:prstGeom>
+          <a:noFill/>
+          <a:ln>
+            <a:noFill/>
+          </a:ln>
+        </p:spPr>
+        <p:style>
+          <a:lnRef idx="2">
+            <a:schemeClr val="accent1">
+              <a:shade val="50000"/>
+            </a:schemeClr>
+          </a:lnRef>
+          <a:fillRef idx="1">
+            <a:schemeClr val="accent1"/>
+          </a:fillRef>
+          <a:effectRef idx="0">
+            <a:schemeClr val="accent1"/>
+          </a:effectRef>
+          <a:fontRef idx="minor">
+            <a:schemeClr val="lt1"/>
+          </a:fontRef>
+        </p:style>
+        <p:txBody>
+          <a:bodyPr rtlCol="0" anchor="ctr"/>
+          <a:lstStyle/>
+          <a:p>
+            <a:pPr algn="ctr"/>
+            <a:endParaRPr lang="en-GB"/>
+          </a:p>
+        </p:txBody>
+      </p:sp>
+      <p:sp>
+        <p:nvSpPr>
+          <p:cNvPr id="117" name="Oval 116">
+            <a:extLst>
+              <a:ext uri="{FF2B5EF4-FFF2-40B4-BE49-F238E27FC236}">
+                <a16:creationId xmlns:a16="http://schemas.microsoft.com/office/drawing/2014/main" id="{A4F10F70-A78C-F369-E3AF-93EE886BF6DF}"/>
+              </a:ext>
+            </a:extLst>
+          </p:cNvPr>
+          <p:cNvSpPr/>
+          <p:nvPr/>
+        </p:nvSpPr>
+        <p:spPr>
+          <a:xfrm>
+            <a:off x="4374165" y="5470705"/>
+            <a:ext cx="243102" cy="149273"/>
+          </a:xfrm>
+          <a:prstGeom prst="ellipse">
+            <a:avLst/>
+          </a:prstGeom>
+          <a:noFill/>
+          <a:ln>
+            <a:noFill/>
+          </a:ln>
+        </p:spPr>
+        <p:style>
+          <a:lnRef idx="2">
+            <a:schemeClr val="accent1">
+              <a:shade val="50000"/>
+            </a:schemeClr>
+          </a:lnRef>
+          <a:fillRef idx="1">
+            <a:schemeClr val="accent1"/>
+          </a:fillRef>
+          <a:effectRef idx="0">
+            <a:schemeClr val="accent1"/>
+          </a:effectRef>
+          <a:fontRef idx="minor">
+            <a:schemeClr val="lt1"/>
+          </a:fontRef>
+        </p:style>
+        <p:txBody>
+          <a:bodyPr rtlCol="0" anchor="ctr"/>
+          <a:lstStyle/>
+          <a:p>
+            <a:pPr algn="ctr"/>
+            <a:endParaRPr lang="en-GB"/>
+          </a:p>
+        </p:txBody>
+      </p:sp>
+      <p:sp>
+        <p:nvSpPr>
+          <p:cNvPr id="118" name="Oval 117">
+            <a:extLst>
+              <a:ext uri="{FF2B5EF4-FFF2-40B4-BE49-F238E27FC236}">
+                <a16:creationId xmlns:a16="http://schemas.microsoft.com/office/drawing/2014/main" id="{6C0A1FF2-0DE4-D26A-4F4D-6482B5E988BC}"/>
+              </a:ext>
+            </a:extLst>
+          </p:cNvPr>
+          <p:cNvSpPr/>
+          <p:nvPr/>
+        </p:nvSpPr>
+        <p:spPr>
+          <a:xfrm>
+            <a:off x="4478694" y="5661393"/>
+            <a:ext cx="243102" cy="149273"/>
+          </a:xfrm>
+          <a:prstGeom prst="ellipse">
+            <a:avLst/>
+          </a:prstGeom>
+          <a:noFill/>
+          <a:ln>
+            <a:noFill/>
+          </a:ln>
+        </p:spPr>
+        <p:style>
+          <a:lnRef idx="2">
+            <a:schemeClr val="accent1">
+              <a:shade val="50000"/>
+            </a:schemeClr>
+          </a:lnRef>
+          <a:fillRef idx="1">
+            <a:schemeClr val="accent1"/>
+          </a:fillRef>
+          <a:effectRef idx="0">
+            <a:schemeClr val="accent1"/>
+          </a:effectRef>
+          <a:fontRef idx="minor">
+            <a:schemeClr val="lt1"/>
+          </a:fontRef>
+        </p:style>
+        <p:txBody>
+          <a:bodyPr rtlCol="0" anchor="ctr"/>
+          <a:lstStyle/>
+          <a:p>
+            <a:pPr algn="ctr"/>
+            <a:endParaRPr lang="en-GB"/>
+          </a:p>
+        </p:txBody>
+      </p:sp>
+      <p:cxnSp>
+        <p:nvCxnSpPr>
+          <p:cNvPr id="119" name="Connector: Elbow 118">
+            <a:extLst>
+              <a:ext uri="{FF2B5EF4-FFF2-40B4-BE49-F238E27FC236}">
+                <a16:creationId xmlns:a16="http://schemas.microsoft.com/office/drawing/2014/main" id="{83507ED1-5018-BA15-A960-234D84184FE2}"/>
+              </a:ext>
+            </a:extLst>
+          </p:cNvPr>
+          <p:cNvCxnSpPr>
+            <a:cxnSpLocks/>
+            <a:stCxn id="113" idx="6"/>
+            <a:endCxn id="84" idx="3"/>
+          </p:cNvCxnSpPr>
+          <p:nvPr/>
+        </p:nvCxnSpPr>
+        <p:spPr>
+          <a:xfrm>
+            <a:off x="4349737" y="4466131"/>
+            <a:ext cx="1746262" cy="1919250"/>
+          </a:xfrm>
+          <a:prstGeom prst="bentConnector3">
+            <a:avLst>
+              <a:gd name="adj1" fmla="val 113091"/>
+            </a:avLst>
+          </a:prstGeom>
+          <a:ln>
+            <a:solidFill>
+              <a:schemeClr val="tx1"/>
+            </a:solidFill>
+            <a:prstDash val="lgDash"/>
+            <a:tailEnd type="triangle"/>
+          </a:ln>
+        </p:spPr>
+        <p:style>
+          <a:lnRef idx="1">
+            <a:schemeClr val="accent1"/>
+          </a:lnRef>
+          <a:fillRef idx="0">
+            <a:schemeClr val="accent1"/>
+          </a:fillRef>
+          <a:effectRef idx="0">
+            <a:schemeClr val="accent1"/>
+          </a:effectRef>
+          <a:fontRef idx="minor">
+            <a:schemeClr val="tx1"/>
+          </a:fontRef>
+        </p:style>
+      </p:cxnSp>
+      <p:cxnSp>
+        <p:nvCxnSpPr>
+          <p:cNvPr id="122" name="Connector: Elbow 121">
+            <a:extLst>
+              <a:ext uri="{FF2B5EF4-FFF2-40B4-BE49-F238E27FC236}">
+                <a16:creationId xmlns:a16="http://schemas.microsoft.com/office/drawing/2014/main" id="{BE345294-86EF-4403-B703-F1C85A0664C0}"/>
+              </a:ext>
+            </a:extLst>
+          </p:cNvPr>
+          <p:cNvCxnSpPr>
+            <a:cxnSpLocks/>
+            <a:stCxn id="114" idx="6"/>
+            <a:endCxn id="85" idx="3"/>
+          </p:cNvCxnSpPr>
+          <p:nvPr/>
+        </p:nvCxnSpPr>
+        <p:spPr>
+          <a:xfrm>
+            <a:off x="4478694" y="4672619"/>
+            <a:ext cx="1617305" cy="2362849"/>
+          </a:xfrm>
+          <a:prstGeom prst="bentConnector3">
+            <a:avLst>
+              <a:gd name="adj1" fmla="val 123029"/>
+            </a:avLst>
+          </a:prstGeom>
+          <a:ln>
+            <a:solidFill>
+              <a:schemeClr val="tx1"/>
+            </a:solidFill>
+            <a:prstDash val="lgDash"/>
+            <a:tailEnd type="triangle"/>
+          </a:ln>
+        </p:spPr>
+        <p:style>
+          <a:lnRef idx="1">
+            <a:schemeClr val="accent1"/>
+          </a:lnRef>
+          <a:fillRef idx="0">
+            <a:schemeClr val="accent1"/>
+          </a:fillRef>
+          <a:effectRef idx="0">
+            <a:schemeClr val="accent1"/>
+          </a:effectRef>
+          <a:fontRef idx="minor">
+            <a:schemeClr val="tx1"/>
+          </a:fontRef>
+        </p:style>
+      </p:cxnSp>
+      <p:cxnSp>
+        <p:nvCxnSpPr>
+          <p:cNvPr id="125" name="Connector: Elbow 124">
+            <a:extLst>
+              <a:ext uri="{FF2B5EF4-FFF2-40B4-BE49-F238E27FC236}">
+                <a16:creationId xmlns:a16="http://schemas.microsoft.com/office/drawing/2014/main" id="{24328238-030D-513B-94D7-632679C3DE98}"/>
+              </a:ext>
+            </a:extLst>
+          </p:cNvPr>
+          <p:cNvCxnSpPr>
+            <a:cxnSpLocks/>
+            <a:stCxn id="115" idx="6"/>
+            <a:endCxn id="85" idx="3"/>
+          </p:cNvCxnSpPr>
+          <p:nvPr/>
+        </p:nvCxnSpPr>
+        <p:spPr>
+          <a:xfrm>
+            <a:off x="4866769" y="5093958"/>
+            <a:ext cx="1229230" cy="1941510"/>
+          </a:xfrm>
+          <a:prstGeom prst="bentConnector3">
+            <a:avLst>
+              <a:gd name="adj1" fmla="val 130192"/>
+            </a:avLst>
+          </a:prstGeom>
+          <a:ln>
+            <a:solidFill>
+              <a:schemeClr val="tx1"/>
+            </a:solidFill>
+            <a:prstDash val="lgDash"/>
+            <a:tailEnd type="triangle"/>
+          </a:ln>
+        </p:spPr>
+        <p:style>
+          <a:lnRef idx="1">
+            <a:schemeClr val="accent1"/>
+          </a:lnRef>
+          <a:fillRef idx="0">
+            <a:schemeClr val="accent1"/>
+          </a:fillRef>
+          <a:effectRef idx="0">
+            <a:schemeClr val="accent1"/>
+          </a:effectRef>
+          <a:fontRef idx="minor">
+            <a:schemeClr val="tx1"/>
+          </a:fontRef>
+        </p:style>
+      </p:cxnSp>
+      <p:cxnSp>
+        <p:nvCxnSpPr>
+          <p:cNvPr id="130" name="Connector: Elbow 129">
+            <a:extLst>
+              <a:ext uri="{FF2B5EF4-FFF2-40B4-BE49-F238E27FC236}">
+                <a16:creationId xmlns:a16="http://schemas.microsoft.com/office/drawing/2014/main" id="{5717C553-BF76-9AA0-CA4A-34039B594964}"/>
+              </a:ext>
+            </a:extLst>
+          </p:cNvPr>
+          <p:cNvCxnSpPr>
+            <a:cxnSpLocks/>
+            <a:stCxn id="116" idx="6"/>
+            <a:endCxn id="84" idx="3"/>
+          </p:cNvCxnSpPr>
+          <p:nvPr/>
+        </p:nvCxnSpPr>
+        <p:spPr>
+          <a:xfrm>
+            <a:off x="5326981" y="5324790"/>
+            <a:ext cx="769018" cy="1060591"/>
+          </a:xfrm>
+          <a:prstGeom prst="bentConnector3">
+            <a:avLst>
+              <a:gd name="adj1" fmla="val 129726"/>
+            </a:avLst>
+          </a:prstGeom>
+          <a:ln>
+            <a:solidFill>
+              <a:schemeClr val="tx1"/>
+            </a:solidFill>
+            <a:prstDash val="lgDash"/>
+            <a:tailEnd type="triangle"/>
+          </a:ln>
+        </p:spPr>
+        <p:style>
+          <a:lnRef idx="1">
+            <a:schemeClr val="accent1"/>
+          </a:lnRef>
+          <a:fillRef idx="0">
+            <a:schemeClr val="accent1"/>
+          </a:fillRef>
+          <a:effectRef idx="0">
+            <a:schemeClr val="accent1"/>
+          </a:effectRef>
+          <a:fontRef idx="minor">
+            <a:schemeClr val="tx1"/>
+          </a:fontRef>
+        </p:style>
+      </p:cxnSp>
+      <p:cxnSp>
+        <p:nvCxnSpPr>
+          <p:cNvPr id="133" name="Connector: Elbow 132">
+            <a:extLst>
+              <a:ext uri="{FF2B5EF4-FFF2-40B4-BE49-F238E27FC236}">
+                <a16:creationId xmlns:a16="http://schemas.microsoft.com/office/drawing/2014/main" id="{9F72B10C-A4F6-B418-79E0-DEC5226F1521}"/>
+              </a:ext>
+            </a:extLst>
+          </p:cNvPr>
+          <p:cNvCxnSpPr>
+            <a:cxnSpLocks/>
+            <a:stCxn id="117" idx="6"/>
+            <a:endCxn id="86" idx="3"/>
+          </p:cNvCxnSpPr>
+          <p:nvPr/>
+        </p:nvCxnSpPr>
+        <p:spPr>
+          <a:xfrm>
+            <a:off x="4617267" y="5545342"/>
+            <a:ext cx="1478732" cy="2140213"/>
+          </a:xfrm>
+          <a:prstGeom prst="bentConnector3">
+            <a:avLst>
+              <a:gd name="adj1" fmla="val 136998"/>
+            </a:avLst>
+          </a:prstGeom>
+          <a:ln>
+            <a:solidFill>
+              <a:schemeClr val="tx1"/>
+            </a:solidFill>
+            <a:prstDash val="lgDash"/>
+            <a:tailEnd type="triangle"/>
+          </a:ln>
+        </p:spPr>
+        <p:style>
+          <a:lnRef idx="1">
+            <a:schemeClr val="accent1"/>
+          </a:lnRef>
+          <a:fillRef idx="0">
+            <a:schemeClr val="accent1"/>
+          </a:fillRef>
+          <a:effectRef idx="0">
+            <a:schemeClr val="accent1"/>
+          </a:effectRef>
+          <a:fontRef idx="minor">
+            <a:schemeClr val="tx1"/>
+          </a:fontRef>
+        </p:style>
+      </p:cxnSp>
+      <p:cxnSp>
+        <p:nvCxnSpPr>
+          <p:cNvPr id="138" name="Connector: Elbow 137">
+            <a:extLst>
+              <a:ext uri="{FF2B5EF4-FFF2-40B4-BE49-F238E27FC236}">
+                <a16:creationId xmlns:a16="http://schemas.microsoft.com/office/drawing/2014/main" id="{1DAE210F-0B1C-5095-2C7A-499429CCA3B0}"/>
+              </a:ext>
+            </a:extLst>
+          </p:cNvPr>
+          <p:cNvCxnSpPr>
+            <a:cxnSpLocks/>
+            <a:stCxn id="118" idx="6"/>
+            <a:endCxn id="90" idx="3"/>
+          </p:cNvCxnSpPr>
+          <p:nvPr/>
+        </p:nvCxnSpPr>
+        <p:spPr>
+          <a:xfrm>
+            <a:off x="4721796" y="5736030"/>
+            <a:ext cx="1679003" cy="3640982"/>
+          </a:xfrm>
+          <a:prstGeom prst="bentConnector3">
+            <a:avLst>
+              <a:gd name="adj1" fmla="val 124018"/>
+            </a:avLst>
+          </a:prstGeom>
+          <a:ln>
+            <a:solidFill>
+              <a:schemeClr val="tx1"/>
+            </a:solidFill>
+            <a:prstDash val="lgDash"/>
+            <a:tailEnd type="triangle"/>
+          </a:ln>
+        </p:spPr>
+        <p:style>
+          <a:lnRef idx="1">
+            <a:schemeClr val="accent1"/>
+          </a:lnRef>
+          <a:fillRef idx="0">
+            <a:schemeClr val="accent1"/>
+          </a:fillRef>
+          <a:effectRef idx="0">
+            <a:schemeClr val="accent1"/>
+          </a:effectRef>
+          <a:fontRef idx="minor">
+            <a:schemeClr val="tx1"/>
+          </a:fontRef>
+        </p:style>
+      </p:cxnSp>
+      <p:sp>
+        <p:nvSpPr>
+          <p:cNvPr id="40" name="TextBox 39">
+            <a:extLst>
+              <a:ext uri="{FF2B5EF4-FFF2-40B4-BE49-F238E27FC236}">
+                <a16:creationId xmlns:a16="http://schemas.microsoft.com/office/drawing/2014/main" id="{F3BA6F6E-CC81-BBF3-1141-5AC22CF394C9}"/>
+              </a:ext>
+            </a:extLst>
+          </p:cNvPr>
+          <p:cNvSpPr txBox="1"/>
+          <p:nvPr/>
+        </p:nvSpPr>
+        <p:spPr>
+          <a:xfrm>
+            <a:off x="3266442" y="8066546"/>
+            <a:ext cx="2834525" cy="526639"/>
+          </a:xfrm>
+          <a:prstGeom prst="rect">
+            <a:avLst/>
+          </a:prstGeom>
+          <a:solidFill>
+            <a:schemeClr val="accent6">
+              <a:lumMod val="40000"/>
+              <a:lumOff val="60000"/>
+            </a:schemeClr>
+          </a:solidFill>
+          <a:ln>
+            <a:solidFill>
+              <a:schemeClr val="tx1"/>
+            </a:solidFill>
+            <a:prstDash val="solid"/>
+          </a:ln>
+        </p:spPr>
+        <p:txBody>
+          <a:bodyPr wrap="square" rtlCol="0">
+            <a:noAutofit/>
+          </a:bodyPr>
+          <a:lstStyle/>
+          <a:p>
+            <a:pPr>
+              <a:spcAft>
+                <a:spcPts val="300"/>
+              </a:spcAft>
+            </a:pPr>
+            <a:r>
+              <a:rPr lang="en-GB" sz="1400" b="1" dirty="0"/>
+              <a:t>Location</a:t>
+            </a:r>
+          </a:p>
+        </p:txBody>
+      </p:sp>
     </p:spTree>
     <p:extLst>
       <p:ext uri="{BB962C8B-B14F-4D97-AF65-F5344CB8AC3E}">

</xml_diff>